<commit_message>
add slide with mailing list address
git-svn-id: http://escidev5.fiz-karlsruhe.de:8888/prototype/branches/eSciDocExamples/1.1/eSciDocExamples/@34513 5c398c58-3d0a-0410-a38c-d0825f6816e0
</commit_message>
<xml_diff>
--- a/doc/presentation.pptx
+++ b/doc/presentation.pptx
@@ -5,7 +5,7 @@
     <p:sldMasterId id="2147483649" r:id="rId1"/>
   </p:sldMasterIdLst>
   <p:notesMasterIdLst>
-    <p:notesMasterId r:id="rId17"/>
+    <p:notesMasterId r:id="rId18"/>
   </p:notesMasterIdLst>
   <p:sldIdLst>
     <p:sldId id="256" r:id="rId2"/>
@@ -23,6 +23,7 @@
     <p:sldId id="307" r:id="rId14"/>
     <p:sldId id="308" r:id="rId15"/>
     <p:sldId id="313" r:id="rId16"/>
+    <p:sldId id="315" r:id="rId17"/>
   </p:sldIdLst>
   <p:sldSz cx="9144000" cy="6858000" type="screen4x3"/>
   <p:notesSz cx="7099300" cy="10234613"/>
@@ -874,7 +875,7 @@
                   <a:spcPct val="50000"/>
                 </a:spcBef>
               </a:pPr>
-              <a:t>20.01.2010</a:t>
+              <a:t>24.03.2010</a:t>
             </a:fld>
             <a:endParaRPr lang="de-DE" sz="1000">
               <a:solidFill>
@@ -2664,7 +2665,7 @@
                   <a:spcPct val="50000"/>
                 </a:spcBef>
               </a:pPr>
-              <a:t>20.01.2010</a:t>
+              <a:t>24.03.2010</a:t>
             </a:fld>
             <a:endParaRPr lang="de-DE" sz="1000">
               <a:solidFill>
@@ -3365,6 +3366,13 @@
   <p:transition>
     <p:fade/>
   </p:transition>
+  <p:timing>
+    <p:tnLst>
+      <p:par>
+        <p:cTn id="1" dur="indefinite" restart="never" nodeType="tmRoot"/>
+      </p:par>
+    </p:tnLst>
+  </p:timing>
 </p:sld>
 </file>
 
@@ -3478,6 +3486,13 @@
   <p:transition>
     <p:fade/>
   </p:transition>
+  <p:timing>
+    <p:tnLst>
+      <p:par>
+        <p:cTn id="1" dur="indefinite" restart="never" nodeType="tmRoot"/>
+      </p:par>
+    </p:tnLst>
+  </p:timing>
 </p:sld>
 </file>
 
@@ -3569,8 +3584,18 @@
           </a:p>
           <a:p>
             <a:r>
-              <a:rPr lang="de-DE" dirty="0" err="1" smtClean="0"/>
-              <a:t>release</a:t>
+              <a:rPr lang="de-DE" dirty="0" smtClean="0"/>
+              <a:t>Release</a:t>
+            </a:r>
+            <a:endParaRPr lang="de-DE" dirty="0" smtClean="0"/>
+          </a:p>
+          <a:p>
+            <a:endParaRPr lang="de-DE" dirty="0" smtClean="0"/>
+          </a:p>
+          <a:p>
+            <a:r>
+              <a:rPr lang="de-DE" dirty="0" smtClean="0"/>
+              <a:t>http://&lt;host&gt;/ir/item/&lt;objid&gt;</a:t>
             </a:r>
             <a:endParaRPr lang="de-DE" dirty="0" smtClean="0"/>
           </a:p>
@@ -3591,6 +3616,13 @@
   <p:transition>
     <p:fade/>
   </p:transition>
+  <p:timing>
+    <p:tnLst>
+      <p:par>
+        <p:cTn id="1" dur="indefinite" restart="never" nodeType="tmRoot"/>
+      </p:par>
+    </p:tnLst>
+  </p:timing>
 </p:sld>
 </file>
 
@@ -3682,8 +3714,17 @@
           </a:p>
           <a:p>
             <a:r>
-              <a:rPr lang="de-DE" smtClean="0"/>
+              <a:rPr lang="de-DE" dirty="0" smtClean="0"/>
               <a:t>Release</a:t>
+            </a:r>
+          </a:p>
+          <a:p>
+            <a:endParaRPr lang="de-DE" dirty="0" smtClean="0"/>
+          </a:p>
+          <a:p>
+            <a:r>
+              <a:rPr lang="de-DE" dirty="0" smtClean="0"/>
+              <a:t>http://&lt;host&gt;/ir/container/&lt;objid&gt;</a:t>
             </a:r>
             <a:endParaRPr lang="de-DE" dirty="0" smtClean="0"/>
           </a:p>
@@ -3697,6 +3738,13 @@
   <p:transition>
     <p:fade/>
   </p:transition>
+  <p:timing>
+    <p:tnLst>
+      <p:par>
+        <p:cTn id="1" dur="indefinite" restart="never" nodeType="tmRoot"/>
+      </p:par>
+    </p:tnLst>
+  </p:timing>
 </p:sld>
 </file>
 
@@ -3798,6 +3846,13 @@
   <p:transition>
     <p:fade/>
   </p:transition>
+  <p:timing>
+    <p:tnLst>
+      <p:par>
+        <p:cTn id="1" dur="indefinite" restart="never" nodeType="tmRoot"/>
+      </p:par>
+    </p:tnLst>
+  </p:timing>
 </p:sld>
 </file>
 
@@ -3919,6 +3974,108 @@
   <p:transition>
     <p:fade/>
   </p:transition>
+  <p:timing>
+    <p:tnLst>
+      <p:par>
+        <p:cTn id="1" dur="indefinite" restart="never" nodeType="tmRoot"/>
+      </p:par>
+    </p:tnLst>
+  </p:timing>
+</p:sld>
+</file>
+
+<file path=ppt/slides/slide16.xml><?xml version="1.0" encoding="utf-8"?>
+<p:sld xmlns:a="http://schemas.openxmlformats.org/drawingml/2006/main" xmlns:r="http://schemas.openxmlformats.org/officeDocument/2006/relationships" xmlns:p="http://schemas.openxmlformats.org/presentationml/2006/main">
+  <p:cSld>
+    <p:spTree>
+      <p:nvGrpSpPr>
+        <p:cNvPr id="1" name=""/>
+        <p:cNvGrpSpPr/>
+        <p:nvPr/>
+      </p:nvGrpSpPr>
+      <p:grpSpPr>
+        <a:xfrm>
+          <a:off x="0" y="0"/>
+          <a:ext cx="0" cy="0"/>
+          <a:chOff x="0" y="0"/>
+          <a:chExt cx="0" cy="0"/>
+        </a:xfrm>
+      </p:grpSpPr>
+      <p:sp>
+        <p:nvSpPr>
+          <p:cNvPr id="2" name="Titel 1"/>
+          <p:cNvSpPr>
+            <a:spLocks noGrp="1"/>
+          </p:cNvSpPr>
+          <p:nvPr>
+            <p:ph type="title"/>
+          </p:nvPr>
+        </p:nvSpPr>
+        <p:spPr/>
+        <p:txBody>
+          <a:bodyPr/>
+          <a:lstStyle/>
+          <a:p>
+            <a:r>
+              <a:rPr lang="de-DE" dirty="0" smtClean="0"/>
+              <a:t>Vielen Dank! Fragen?</a:t>
+            </a:r>
+            <a:endParaRPr lang="de-DE" dirty="0"/>
+          </a:p>
+        </p:txBody>
+      </p:sp>
+      <p:sp>
+        <p:nvSpPr>
+          <p:cNvPr id="3" name="Inhaltsplatzhalter 2"/>
+          <p:cNvSpPr>
+            <a:spLocks noGrp="1"/>
+          </p:cNvSpPr>
+          <p:nvPr>
+            <p:ph idx="1"/>
+          </p:nvPr>
+        </p:nvSpPr>
+        <p:spPr/>
+        <p:txBody>
+          <a:bodyPr/>
+          <a:lstStyle/>
+          <a:p>
+            <a:r>
+              <a:rPr lang="de-DE" dirty="0" smtClean="0">
+                <a:hlinkClick r:id="rId2"/>
+              </a:rPr>
+              <a:t>Mailingliste: infrastructure-user@escidoc.org</a:t>
+            </a:r>
+            <a:endParaRPr lang="de-DE" dirty="0" smtClean="0"/>
+          </a:p>
+          <a:p>
+            <a:r>
+              <a:rPr lang="de-DE" dirty="0" smtClean="0">
+                <a:hlinkClick r:id="rId3"/>
+              </a:rPr>
+              <a:t>Website: www.escidoc.org</a:t>
+            </a:r>
+            <a:endParaRPr lang="de-DE" dirty="0" smtClean="0"/>
+          </a:p>
+          <a:p>
+            <a:endParaRPr lang="de-DE" dirty="0"/>
+          </a:p>
+        </p:txBody>
+      </p:sp>
+    </p:spTree>
+  </p:cSld>
+  <p:clrMapOvr>
+    <a:masterClrMapping/>
+  </p:clrMapOvr>
+  <p:transition>
+    <p:fade/>
+  </p:transition>
+  <p:timing>
+    <p:tnLst>
+      <p:par>
+        <p:cTn id="1" dur="indefinite" restart="never" nodeType="tmRoot"/>
+      </p:par>
+    </p:tnLst>
+  </p:timing>
 </p:sld>
 </file>
 
@@ -3985,6 +4142,17 @@
               <a:rPr lang="de-DE" dirty="0" err="1" smtClean="0"/>
               <a:t>representation</a:t>
             </a:r>
+            <a:r>
+              <a:rPr lang="de-DE" dirty="0" smtClean="0"/>
+              <a:t/>
+            </a:r>
+            <a:br>
+              <a:rPr lang="de-DE" dirty="0" smtClean="0"/>
+            </a:br>
+            <a:r>
+              <a:rPr lang="de-DE" dirty="0" smtClean="0"/>
+              <a:t>http://&lt;host&gt;:8080/ir/item/escidoc:ex5</a:t>
+            </a:r>
             <a:endParaRPr lang="de-DE" dirty="0" smtClean="0"/>
           </a:p>
           <a:p>
@@ -4054,6 +4222,13 @@
   <p:transition>
     <p:fade/>
   </p:transition>
+  <p:timing>
+    <p:tnLst>
+      <p:par>
+        <p:cTn id="1" dur="indefinite" restart="never" nodeType="tmRoot"/>
+      </p:par>
+    </p:tnLst>
+  </p:timing>
 </p:sld>
 </file>
 
@@ -4170,6 +4345,13 @@
   <p:transition>
     <p:fade/>
   </p:transition>
+  <p:timing>
+    <p:tnLst>
+      <p:par>
+        <p:cTn id="1" dur="indefinite" restart="never" nodeType="tmRoot"/>
+      </p:par>
+    </p:tnLst>
+  </p:timing>
 </p:sld>
 </file>
 
@@ -4320,6 +4502,13 @@
   <p:transition>
     <p:fade/>
   </p:transition>
+  <p:timing>
+    <p:tnLst>
+      <p:par>
+        <p:cTn id="1" dur="indefinite" restart="never" nodeType="tmRoot"/>
+      </p:par>
+    </p:tnLst>
+  </p:timing>
 </p:sld>
 </file>
 
@@ -4383,6 +4572,13 @@
   <p:transition>
     <p:fade/>
   </p:transition>
+  <p:timing>
+    <p:tnLst>
+      <p:par>
+        <p:cTn id="1" dur="indefinite" restart="never" nodeType="tmRoot"/>
+      </p:par>
+    </p:tnLst>
+  </p:timing>
 </p:sld>
 </file>
 
@@ -4603,6 +4799,13 @@
   <p:transition>
     <p:fade/>
   </p:transition>
+  <p:timing>
+    <p:tnLst>
+      <p:par>
+        <p:cTn id="1" dur="indefinite" restart="never" nodeType="tmRoot"/>
+      </p:par>
+    </p:tnLst>
+  </p:timing>
 </p:sld>
 </file>
 
@@ -4810,6 +5013,13 @@
   <p:transition>
     <p:fade/>
   </p:transition>
+  <p:timing>
+    <p:tnLst>
+      <p:par>
+        <p:cTn id="1" dur="indefinite" restart="never" nodeType="tmRoot"/>
+      </p:par>
+    </p:tnLst>
+  </p:timing>
 </p:sld>
 </file>
 
@@ -5047,6 +5257,13 @@
   <p:transition>
     <p:fade/>
   </p:transition>
+  <p:timing>
+    <p:tnLst>
+      <p:par>
+        <p:cTn id="1" dur="indefinite" restart="never" nodeType="tmRoot"/>
+      </p:par>
+    </p:tnLst>
+  </p:timing>
 </p:sld>
 </file>
 
@@ -5281,6 +5498,13 @@
   <p:transition>
     <p:fade/>
   </p:transition>
+  <p:timing>
+    <p:tnLst>
+      <p:par>
+        <p:cTn id="1" dur="indefinite" restart="never" nodeType="tmRoot"/>
+      </p:par>
+    </p:tnLst>
+  </p:timing>
 </p:sld>
 </file>
 

</xml_diff>

<commit_message>
fix last page with URL (use english)
git-svn-id: http://escidev5.fiz-karlsruhe.de:8888/prototype/branches/eSciDocExamples/1.1/eSciDocExamples/@34545 5c398c58-3d0a-0410-a38c-d0825f6816e0
</commit_message>
<xml_diff>
--- a/doc/presentation.pptx
+++ b/doc/presentation.pptx
@@ -875,7 +875,7 @@
                   <a:spcPct val="50000"/>
                 </a:spcBef>
               </a:pPr>
-              <a:t>24.03.2010</a:t>
+              <a:t>29.03.2010</a:t>
             </a:fld>
             <a:endParaRPr lang="de-DE" sz="1000">
               <a:solidFill>
@@ -2665,7 +2665,7 @@
                   <a:spcPct val="50000"/>
                 </a:spcBef>
               </a:pPr>
-              <a:t>24.03.2010</a:t>
+              <a:t>29.03.2010</a:t>
             </a:fld>
             <a:endParaRPr lang="de-DE" sz="1000">
               <a:solidFill>
@@ -3587,17 +3587,15 @@
               <a:rPr lang="de-DE" dirty="0" smtClean="0"/>
               <a:t>Release</a:t>
             </a:r>
+          </a:p>
+          <a:p>
             <a:endParaRPr lang="de-DE" dirty="0" smtClean="0"/>
           </a:p>
           <a:p>
-            <a:endParaRPr lang="de-DE" dirty="0" smtClean="0"/>
-          </a:p>
-          <a:p>
             <a:r>
               <a:rPr lang="de-DE" dirty="0" smtClean="0"/>
               <a:t>http://&lt;host&gt;/ir/item/&lt;objid&gt;</a:t>
             </a:r>
-            <a:endParaRPr lang="de-DE" dirty="0" smtClean="0"/>
           </a:p>
           <a:p>
             <a:pPr lvl="1"/>
@@ -3726,7 +3724,6 @@
               <a:rPr lang="de-DE" dirty="0" smtClean="0"/>
               <a:t>http://&lt;host&gt;/ir/container/&lt;objid&gt;</a:t>
             </a:r>
-            <a:endParaRPr lang="de-DE" dirty="0" smtClean="0"/>
           </a:p>
         </p:txBody>
       </p:sp>
@@ -4017,8 +4014,20 @@
           <a:lstStyle/>
           <a:p>
             <a:r>
-              <a:rPr lang="de-DE" dirty="0" smtClean="0"/>
-              <a:t>Vielen Dank! Fragen?</a:t>
+              <a:rPr lang="de-DE" dirty="0" err="1" smtClean="0"/>
+              <a:t>Thanks</a:t>
+            </a:r>
+            <a:r>
+              <a:rPr lang="de-DE" dirty="0" smtClean="0"/>
+              <a:t>! </a:t>
+            </a:r>
+            <a:r>
+              <a:rPr lang="de-DE" dirty="0" err="1" smtClean="0"/>
+              <a:t>Questions</a:t>
+            </a:r>
+            <a:r>
+              <a:rPr lang="de-DE" dirty="0" smtClean="0"/>
+              <a:t>?</a:t>
             </a:r>
             <a:endParaRPr lang="de-DE" dirty="0"/>
           </a:p>
@@ -4043,7 +4052,7 @@
               <a:rPr lang="de-DE" dirty="0" smtClean="0">
                 <a:hlinkClick r:id="rId2"/>
               </a:rPr>
-              <a:t>Mailingliste: infrastructure-user@escidoc.org</a:t>
+              <a:t>infrastructure-user@escidoc.org</a:t>
             </a:r>
             <a:endParaRPr lang="de-DE" dirty="0" smtClean="0"/>
           </a:p>
@@ -4052,7 +4061,7 @@
               <a:rPr lang="de-DE" dirty="0" smtClean="0">
                 <a:hlinkClick r:id="rId3"/>
               </a:rPr>
-              <a:t>Website: www.escidoc.org</a:t>
+              <a:t>www.escidoc.org</a:t>
             </a:r>
             <a:endParaRPr lang="de-DE" dirty="0" smtClean="0"/>
           </a:p>
@@ -4153,7 +4162,6 @@
               <a:rPr lang="de-DE" dirty="0" smtClean="0"/>
               <a:t>http://&lt;host&gt;:8080/ir/item/escidoc:ex5</a:t>
             </a:r>
-            <a:endParaRPr lang="de-DE" dirty="0" smtClean="0"/>
           </a:p>
           <a:p>
             <a:r>

</xml_diff>